<commit_message>
reworked the x-/y-histogram slides in the presentation
</commit_message>
<xml_diff>
--- a/project/Präsentation CV-Prak [Di].pptx
+++ b/project/Präsentation CV-Prak [Di].pptx
@@ -5,7 +5,7 @@
     <p:sldMasterId id="2147483648" r:id="rId1"/>
   </p:sldMasterIdLst>
   <p:notesMasterIdLst>
-    <p:notesMasterId r:id="rId14"/>
+    <p:notesMasterId r:id="rId15"/>
   </p:notesMasterIdLst>
   <p:sldIdLst>
     <p:sldId id="256" r:id="rId2"/>
@@ -14,12 +14,13 @@
     <p:sldId id="259" r:id="rId5"/>
     <p:sldId id="260" r:id="rId6"/>
     <p:sldId id="261" r:id="rId7"/>
-    <p:sldId id="262" r:id="rId8"/>
-    <p:sldId id="264" r:id="rId9"/>
-    <p:sldId id="263" r:id="rId10"/>
-    <p:sldId id="266" r:id="rId11"/>
-    <p:sldId id="265" r:id="rId12"/>
-    <p:sldId id="267" r:id="rId13"/>
+    <p:sldId id="268" r:id="rId8"/>
+    <p:sldId id="262" r:id="rId9"/>
+    <p:sldId id="264" r:id="rId10"/>
+    <p:sldId id="263" r:id="rId11"/>
+    <p:sldId id="266" r:id="rId12"/>
+    <p:sldId id="265" r:id="rId13"/>
+    <p:sldId id="267" r:id="rId14"/>
   </p:sldIdLst>
   <p:sldSz cx="12192000" cy="6858000"/>
   <p:notesSz cx="6858000" cy="9144000"/>
@@ -369,7 +370,7 @@
           <a:p>
             <a:fld id="{208D4F3F-4ED1-4402-86B6-2A869C3EDED9}" type="slidenum">
               <a:rPr lang="de-DE" smtClean="0"/>
-              <a:t>‹#›</a:t>
+              <a:t>‹Nr.›</a:t>
             </a:fld>
             <a:endParaRPr lang="de-DE"/>
           </a:p>
@@ -763,7 +764,7 @@
           <a:p>
             <a:fld id="{96761CF4-FD5E-4D5A-A59C-3541EFE10B8D}" type="slidenum">
               <a:rPr lang="de-DE" smtClean="0"/>
-              <a:t>‹#›</a:t>
+              <a:t>‹Nr.›</a:t>
             </a:fld>
             <a:endParaRPr lang="de-DE"/>
           </a:p>
@@ -961,7 +962,7 @@
           <a:p>
             <a:fld id="{96761CF4-FD5E-4D5A-A59C-3541EFE10B8D}" type="slidenum">
               <a:rPr lang="de-DE" smtClean="0"/>
-              <a:t>‹#›</a:t>
+              <a:t>‹Nr.›</a:t>
             </a:fld>
             <a:endParaRPr lang="de-DE"/>
           </a:p>
@@ -1169,7 +1170,7 @@
           <a:p>
             <a:fld id="{96761CF4-FD5E-4D5A-A59C-3541EFE10B8D}" type="slidenum">
               <a:rPr lang="de-DE" smtClean="0"/>
-              <a:t>‹#›</a:t>
+              <a:t>‹Nr.›</a:t>
             </a:fld>
             <a:endParaRPr lang="de-DE"/>
           </a:p>
@@ -1367,7 +1368,7 @@
           <a:p>
             <a:fld id="{96761CF4-FD5E-4D5A-A59C-3541EFE10B8D}" type="slidenum">
               <a:rPr lang="de-DE" smtClean="0"/>
-              <a:t>‹#›</a:t>
+              <a:t>‹Nr.›</a:t>
             </a:fld>
             <a:endParaRPr lang="de-DE"/>
           </a:p>
@@ -1642,7 +1643,7 @@
           <a:p>
             <a:fld id="{96761CF4-FD5E-4D5A-A59C-3541EFE10B8D}" type="slidenum">
               <a:rPr lang="de-DE" smtClean="0"/>
-              <a:t>‹#›</a:t>
+              <a:t>‹Nr.›</a:t>
             </a:fld>
             <a:endParaRPr lang="de-DE"/>
           </a:p>
@@ -1907,7 +1908,7 @@
           <a:p>
             <a:fld id="{96761CF4-FD5E-4D5A-A59C-3541EFE10B8D}" type="slidenum">
               <a:rPr lang="de-DE" smtClean="0"/>
-              <a:t>‹#›</a:t>
+              <a:t>‹Nr.›</a:t>
             </a:fld>
             <a:endParaRPr lang="de-DE"/>
           </a:p>
@@ -2319,7 +2320,7 @@
           <a:p>
             <a:fld id="{96761CF4-FD5E-4D5A-A59C-3541EFE10B8D}" type="slidenum">
               <a:rPr lang="de-DE" smtClean="0"/>
-              <a:t>‹#›</a:t>
+              <a:t>‹Nr.›</a:t>
             </a:fld>
             <a:endParaRPr lang="de-DE"/>
           </a:p>
@@ -2460,7 +2461,7 @@
           <a:p>
             <a:fld id="{96761CF4-FD5E-4D5A-A59C-3541EFE10B8D}" type="slidenum">
               <a:rPr lang="de-DE" smtClean="0"/>
-              <a:t>‹#›</a:t>
+              <a:t>‹Nr.›</a:t>
             </a:fld>
             <a:endParaRPr lang="de-DE"/>
           </a:p>
@@ -2573,7 +2574,7 @@
           <a:p>
             <a:fld id="{96761CF4-FD5E-4D5A-A59C-3541EFE10B8D}" type="slidenum">
               <a:rPr lang="de-DE" smtClean="0"/>
-              <a:t>‹#›</a:t>
+              <a:t>‹Nr.›</a:t>
             </a:fld>
             <a:endParaRPr lang="de-DE"/>
           </a:p>
@@ -2884,7 +2885,7 @@
           <a:p>
             <a:fld id="{96761CF4-FD5E-4D5A-A59C-3541EFE10B8D}" type="slidenum">
               <a:rPr lang="de-DE" smtClean="0"/>
-              <a:t>‹#›</a:t>
+              <a:t>‹Nr.›</a:t>
             </a:fld>
             <a:endParaRPr lang="de-DE"/>
           </a:p>
@@ -3172,7 +3173,7 @@
           <a:p>
             <a:fld id="{96761CF4-FD5E-4D5A-A59C-3541EFE10B8D}" type="slidenum">
               <a:rPr lang="de-DE" smtClean="0"/>
-              <a:t>‹#›</a:t>
+              <a:t>‹Nr.›</a:t>
             </a:fld>
             <a:endParaRPr lang="de-DE"/>
           </a:p>
@@ -3449,7 +3450,7 @@
           <a:p>
             <a:fld id="{96761CF4-FD5E-4D5A-A59C-3541EFE10B8D}" type="slidenum">
               <a:rPr lang="de-DE" smtClean="0"/>
-              <a:t>‹#›</a:t>
+              <a:t>‹Nr.›</a:t>
             </a:fld>
             <a:endParaRPr lang="de-DE"/>
           </a:p>
@@ -3935,7 +3936,7 @@
           <a:p>
             <a:r>
               <a:rPr lang="de-DE" dirty="0"/>
-              <a:t>CNN- Probleme &amp; Optimierung</a:t>
+              <a:t>CNN- Parameter (am Ende)</a:t>
             </a:r>
           </a:p>
         </p:txBody>
@@ -3961,112 +3962,191 @@
           <a:bodyPr/>
           <a:lstStyle/>
           <a:p>
-            <a:pPr marL="0" indent="0">
-              <a:buNone/>
-            </a:pPr>
-            <a:r>
-              <a:rPr lang="de-DE" sz="3200" b="1" dirty="0"/>
-              <a:t>Probleme</a:t>
-            </a:r>
-          </a:p>
-          <a:p>
-            <a:pPr marL="0" indent="0">
-              <a:buNone/>
-            </a:pPr>
-            <a:r>
-              <a:rPr lang="de-DE" b="1" dirty="0"/>
-              <a:t>Overfitting: </a:t>
-            </a:r>
             <a:r>
               <a:rPr lang="de-DE" dirty="0"/>
-              <a:t>Daten werden auswendig gelernt; keine Generalisierung</a:t>
-            </a:r>
-          </a:p>
-          <a:p>
-            <a:pPr marL="0" indent="0">
-              <a:buNone/>
-            </a:pPr>
-            <a:r>
-              <a:rPr lang="de-DE" b="1" dirty="0"/>
-              <a:t>Zu wenig Daten: </a:t>
-            </a:r>
+              <a:t>Loss: Categorical Crossentropy</a:t>
+            </a:r>
+          </a:p>
+          <a:p>
             <a:r>
               <a:rPr lang="de-DE" dirty="0"/>
-              <a:t>Schlechtere Performance</a:t>
-            </a:r>
-          </a:p>
-          <a:p>
-            <a:pPr marL="0" indent="0">
-              <a:buNone/>
-            </a:pPr>
-            <a:r>
-              <a:rPr lang="de-DE" b="1" dirty="0"/>
-              <a:t>Tradeoff: </a:t>
-            </a:r>
+              <a:t>Optimizer: SGD</a:t>
+            </a:r>
+          </a:p>
+          <a:p>
             <a:r>
               <a:rPr lang="de-DE" dirty="0"/>
-              <a:t>Leistung vs. Zeitverbrauch</a:t>
-            </a:r>
-          </a:p>
-          <a:p>
-            <a:pPr marL="0" indent="0">
-              <a:buNone/>
-            </a:pPr>
+              <a:t>Learning Rate: 0.01</a:t>
+            </a:r>
+          </a:p>
+          <a:p>
             <a:endParaRPr lang="de-DE" dirty="0"/>
           </a:p>
           <a:p>
-            <a:pPr marL="0" indent="0">
-              <a:buNone/>
-            </a:pPr>
             <a:r>
               <a:rPr lang="de-DE" dirty="0"/>
-              <a:t>-&gt; </a:t>
-            </a:r>
-            <a:r>
-              <a:rPr lang="de-DE" b="1" dirty="0"/>
-              <a:t>Early Stopping: </a:t>
-            </a:r>
+              <a:t>Input Size: 2000 je Klasse</a:t>
+            </a:r>
+          </a:p>
+          <a:p>
             <a:r>
               <a:rPr lang="de-DE" dirty="0"/>
-              <a:t>Spart Zeit, wenn sich nichts mehr tut</a:t>
-            </a:r>
-          </a:p>
-          <a:p>
-            <a:pPr marL="0" indent="0">
-              <a:buNone/>
-            </a:pPr>
+              <a:t>Validation Split: 80:20</a:t>
+            </a:r>
+          </a:p>
+          <a:p>
             <a:r>
               <a:rPr lang="de-DE" dirty="0"/>
-              <a:t>-&gt; </a:t>
-            </a:r>
-            <a:r>
-              <a:rPr lang="de-DE" b="1" dirty="0"/>
-              <a:t>Save Best Weights: </a:t>
-            </a:r>
+              <a:t>Batch Size: 32</a:t>
+            </a:r>
+          </a:p>
+          <a:p>
             <a:r>
               <a:rPr lang="de-DE" dirty="0"/>
-              <a:t>Merke gute Parameter</a:t>
-            </a:r>
-          </a:p>
-          <a:p>
-            <a:pPr marL="0" indent="0">
-              <a:buNone/>
-            </a:pPr>
-            <a:r>
-              <a:rPr lang="de-DE" dirty="0"/>
-              <a:t>-&gt; </a:t>
-            </a:r>
-            <a:r>
-              <a:rPr lang="de-DE" b="1" dirty="0"/>
-              <a:t>Restrukturierung des CNNs</a:t>
-            </a:r>
-          </a:p>
-        </p:txBody>
-      </p:sp>
+              <a:t>Epochen: 200</a:t>
+            </a:r>
+          </a:p>
+          <a:p>
+            <a:endParaRPr lang="de-DE" dirty="0"/>
+          </a:p>
+        </p:txBody>
+      </p:sp>
+      <p:sp>
+        <p:nvSpPr>
+          <p:cNvPr id="6" name="TextBox 5">
+            <a:extLst>
+              <a:ext uri="{FF2B5EF4-FFF2-40B4-BE49-F238E27FC236}">
+                <a16:creationId xmlns:a16="http://schemas.microsoft.com/office/drawing/2014/main" id="{A8D97ADF-2896-4CB5-9406-AC15E0A51683}"/>
+              </a:ext>
+            </a:extLst>
+          </p:cNvPr>
+          <p:cNvSpPr txBox="1"/>
+          <p:nvPr/>
+        </p:nvSpPr>
+        <p:spPr>
+          <a:xfrm>
+            <a:off x="838200" y="6311900"/>
+            <a:ext cx="10934700" cy="369332"/>
+          </a:xfrm>
+          <a:prstGeom prst="rect">
+            <a:avLst/>
+          </a:prstGeom>
+          <a:noFill/>
+        </p:spPr>
+        <p:txBody>
+          <a:bodyPr wrap="square" rtlCol="0">
+            <a:spAutoFit/>
+          </a:bodyPr>
+          <a:lstStyle/>
+          <a:p>
+            <a:r>
+              <a:rPr lang="en-US" dirty="0" err="1"/>
+              <a:t>Bildausschnitt</a:t>
+            </a:r>
+            <a:r>
+              <a:rPr lang="en-US" dirty="0"/>
+              <a:t> (</a:t>
+            </a:r>
+            <a:r>
+              <a:rPr lang="en-US" dirty="0" err="1"/>
+              <a:t>oben</a:t>
+            </a:r>
+            <a:r>
+              <a:rPr lang="en-US" dirty="0"/>
+              <a:t>): http://</a:t>
+            </a:r>
+            <a:r>
+              <a:rPr lang="en-US" dirty="0" err="1"/>
+              <a:t>neuronus.com</a:t>
+            </a:r>
+            <a:r>
+              <a:rPr lang="en-US" dirty="0"/>
+              <a:t>/images/news/2017_04/</a:t>
+            </a:r>
+            <a:r>
+              <a:rPr lang="en-US" dirty="0" err="1"/>
+              <a:t>4ff3daca463adbb35a3b725bccf05273.png</a:t>
+            </a:r>
+            <a:endParaRPr lang="en-US" dirty="0"/>
+          </a:p>
+        </p:txBody>
+      </p:sp>
+      <p:pic>
+        <p:nvPicPr>
+          <p:cNvPr id="8" name="Picture 7">
+            <a:extLst>
+              <a:ext uri="{FF2B5EF4-FFF2-40B4-BE49-F238E27FC236}">
+                <a16:creationId xmlns:a16="http://schemas.microsoft.com/office/drawing/2014/main" id="{950CC0A6-9AE0-4CEE-AA66-AE4A8C6D60A2}"/>
+              </a:ext>
+            </a:extLst>
+          </p:cNvPr>
+          <p:cNvPicPr>
+            <a:picLocks noChangeAspect="1"/>
+          </p:cNvPicPr>
+          <p:nvPr/>
+        </p:nvPicPr>
+        <p:blipFill>
+          <a:blip r:embed="rId2">
+            <a:extLst>
+              <a:ext uri="{28A0092B-C50C-407E-A947-70E740481C1C}">
+                <a14:useLocalDpi xmlns:a14="http://schemas.microsoft.com/office/drawing/2010/main" val="0"/>
+              </a:ext>
+            </a:extLst>
+          </a:blip>
+          <a:stretch>
+            <a:fillRect/>
+          </a:stretch>
+        </p:blipFill>
+        <p:spPr>
+          <a:xfrm>
+            <a:off x="6096000" y="1694442"/>
+            <a:ext cx="5676900" cy="2001258"/>
+          </a:xfrm>
+          <a:prstGeom prst="rect">
+            <a:avLst/>
+          </a:prstGeom>
+        </p:spPr>
+      </p:pic>
+      <p:pic>
+        <p:nvPicPr>
+          <p:cNvPr id="10" name="Picture 9">
+            <a:extLst>
+              <a:ext uri="{FF2B5EF4-FFF2-40B4-BE49-F238E27FC236}">
+                <a16:creationId xmlns:a16="http://schemas.microsoft.com/office/drawing/2014/main" id="{5F4F9473-0ECA-4048-81C6-54CB1986CB7B}"/>
+              </a:ext>
+            </a:extLst>
+          </p:cNvPr>
+          <p:cNvPicPr>
+            <a:picLocks noChangeAspect="1"/>
+          </p:cNvPicPr>
+          <p:nvPr/>
+        </p:nvPicPr>
+        <p:blipFill>
+          <a:blip r:embed="rId3">
+            <a:extLst>
+              <a:ext uri="{28A0092B-C50C-407E-A947-70E740481C1C}">
+                <a14:useLocalDpi xmlns:a14="http://schemas.microsoft.com/office/drawing/2010/main" val="0"/>
+              </a:ext>
+            </a:extLst>
+          </a:blip>
+          <a:stretch>
+            <a:fillRect/>
+          </a:stretch>
+        </p:blipFill>
+        <p:spPr>
+          <a:xfrm>
+            <a:off x="5396610" y="4306888"/>
+            <a:ext cx="6027040" cy="1544819"/>
+          </a:xfrm>
+          <a:prstGeom prst="rect">
+            <a:avLst/>
+          </a:prstGeom>
+        </p:spPr>
+      </p:pic>
     </p:spTree>
     <p:extLst>
       <p:ext uri="{BB962C8B-B14F-4D97-AF65-F5344CB8AC3E}">
-        <p14:creationId xmlns:p14="http://schemas.microsoft.com/office/powerpoint/2010/main" val="1144931553"/>
+        <p14:creationId xmlns:p14="http://schemas.microsoft.com/office/powerpoint/2010/main" val="1818316990"/>
       </p:ext>
     </p:extLst>
   </p:cSld>
@@ -4116,6 +4196,187 @@
           <a:p>
             <a:r>
               <a:rPr lang="de-DE" dirty="0"/>
+              <a:t>CNN- Probleme &amp; Optimierung</a:t>
+            </a:r>
+          </a:p>
+        </p:txBody>
+      </p:sp>
+      <p:sp>
+        <p:nvSpPr>
+          <p:cNvPr id="3" name="Inhaltsplatzhalter 2">
+            <a:extLst>
+              <a:ext uri="{FF2B5EF4-FFF2-40B4-BE49-F238E27FC236}">
+                <a16:creationId xmlns:a16="http://schemas.microsoft.com/office/drawing/2014/main" id="{3D0E6730-2CE6-4570-95E1-BCB41F33AEB7}"/>
+              </a:ext>
+            </a:extLst>
+          </p:cNvPr>
+          <p:cNvSpPr>
+            <a:spLocks noGrp="1"/>
+          </p:cNvSpPr>
+          <p:nvPr>
+            <p:ph idx="1"/>
+          </p:nvPr>
+        </p:nvSpPr>
+        <p:spPr/>
+        <p:txBody>
+          <a:bodyPr/>
+          <a:lstStyle/>
+          <a:p>
+            <a:pPr marL="0" indent="0">
+              <a:buNone/>
+            </a:pPr>
+            <a:r>
+              <a:rPr lang="de-DE" sz="3200" b="1" dirty="0"/>
+              <a:t>Probleme</a:t>
+            </a:r>
+          </a:p>
+          <a:p>
+            <a:pPr marL="0" indent="0">
+              <a:buNone/>
+            </a:pPr>
+            <a:r>
+              <a:rPr lang="de-DE" b="1" dirty="0"/>
+              <a:t>Overfitting: </a:t>
+            </a:r>
+            <a:r>
+              <a:rPr lang="de-DE" dirty="0"/>
+              <a:t>Daten werden auswendig gelernt; keine Generalisierung</a:t>
+            </a:r>
+          </a:p>
+          <a:p>
+            <a:pPr marL="0" indent="0">
+              <a:buNone/>
+            </a:pPr>
+            <a:r>
+              <a:rPr lang="de-DE" b="1" dirty="0"/>
+              <a:t>Zu wenig Daten: </a:t>
+            </a:r>
+            <a:r>
+              <a:rPr lang="de-DE" dirty="0"/>
+              <a:t>Schlechtere Performance</a:t>
+            </a:r>
+          </a:p>
+          <a:p>
+            <a:pPr marL="0" indent="0">
+              <a:buNone/>
+            </a:pPr>
+            <a:r>
+              <a:rPr lang="de-DE" b="1" dirty="0"/>
+              <a:t>Tradeoff: </a:t>
+            </a:r>
+            <a:r>
+              <a:rPr lang="de-DE" dirty="0"/>
+              <a:t>Leistung vs. Zeitverbrauch</a:t>
+            </a:r>
+          </a:p>
+          <a:p>
+            <a:pPr marL="0" indent="0">
+              <a:buNone/>
+            </a:pPr>
+            <a:endParaRPr lang="de-DE" dirty="0"/>
+          </a:p>
+          <a:p>
+            <a:pPr marL="0" indent="0">
+              <a:buNone/>
+            </a:pPr>
+            <a:r>
+              <a:rPr lang="de-DE" dirty="0"/>
+              <a:t>-&gt; </a:t>
+            </a:r>
+            <a:r>
+              <a:rPr lang="de-DE" b="1" dirty="0"/>
+              <a:t>Early Stopping: </a:t>
+            </a:r>
+            <a:r>
+              <a:rPr lang="de-DE" dirty="0"/>
+              <a:t>Spart Zeit, wenn sich nichts mehr tut</a:t>
+            </a:r>
+          </a:p>
+          <a:p>
+            <a:pPr marL="0" indent="0">
+              <a:buNone/>
+            </a:pPr>
+            <a:r>
+              <a:rPr lang="de-DE" dirty="0"/>
+              <a:t>-&gt; </a:t>
+            </a:r>
+            <a:r>
+              <a:rPr lang="de-DE" b="1" dirty="0"/>
+              <a:t>Save Best Weights: </a:t>
+            </a:r>
+            <a:r>
+              <a:rPr lang="de-DE" dirty="0"/>
+              <a:t>Merke gute Parameter</a:t>
+            </a:r>
+          </a:p>
+          <a:p>
+            <a:pPr marL="0" indent="0">
+              <a:buNone/>
+            </a:pPr>
+            <a:r>
+              <a:rPr lang="de-DE" dirty="0"/>
+              <a:t>-&gt; </a:t>
+            </a:r>
+            <a:r>
+              <a:rPr lang="de-DE" b="1" dirty="0"/>
+              <a:t>Restrukturierung des CNNs</a:t>
+            </a:r>
+          </a:p>
+        </p:txBody>
+      </p:sp>
+    </p:spTree>
+    <p:extLst>
+      <p:ext uri="{BB962C8B-B14F-4D97-AF65-F5344CB8AC3E}">
+        <p14:creationId xmlns:p14="http://schemas.microsoft.com/office/powerpoint/2010/main" val="1144931553"/>
+      </p:ext>
+    </p:extLst>
+  </p:cSld>
+  <p:clrMapOvr>
+    <a:masterClrMapping/>
+  </p:clrMapOvr>
+</p:sld>
+</file>
+
+<file path=ppt/slides/slide12.xml><?xml version="1.0" encoding="utf-8"?>
+<p:sld xmlns:a="http://schemas.openxmlformats.org/drawingml/2006/main" xmlns:r="http://schemas.openxmlformats.org/officeDocument/2006/relationships" xmlns:p="http://schemas.openxmlformats.org/presentationml/2006/main">
+  <p:cSld>
+    <p:spTree>
+      <p:nvGrpSpPr>
+        <p:cNvPr id="1" name=""/>
+        <p:cNvGrpSpPr/>
+        <p:nvPr/>
+      </p:nvGrpSpPr>
+      <p:grpSpPr>
+        <a:xfrm>
+          <a:off x="0" y="0"/>
+          <a:ext cx="0" cy="0"/>
+          <a:chOff x="0" y="0"/>
+          <a:chExt cx="0" cy="0"/>
+        </a:xfrm>
+      </p:grpSpPr>
+      <p:sp>
+        <p:nvSpPr>
+          <p:cNvPr id="2" name="Titel 1">
+            <a:extLst>
+              <a:ext uri="{FF2B5EF4-FFF2-40B4-BE49-F238E27FC236}">
+                <a16:creationId xmlns:a16="http://schemas.microsoft.com/office/drawing/2014/main" id="{0039F296-496E-47DA-87A9-572B69EE1ED2}"/>
+              </a:ext>
+            </a:extLst>
+          </p:cNvPr>
+          <p:cNvSpPr>
+            <a:spLocks noGrp="1"/>
+          </p:cNvSpPr>
+          <p:nvPr>
+            <p:ph type="title"/>
+          </p:nvPr>
+        </p:nvSpPr>
+        <p:spPr/>
+        <p:txBody>
+          <a:bodyPr/>
+          <a:lstStyle/>
+          <a:p>
+            <a:r>
+              <a:rPr lang="de-DE" dirty="0"/>
               <a:t>CNN - Ergebnisse</a:t>
             </a:r>
           </a:p>
@@ -4171,7 +4432,7 @@
 </p:sld>
 </file>
 
-<file path=ppt/slides/slide12.xml><?xml version="1.0" encoding="utf-8"?>
+<file path=ppt/slides/slide13.xml><?xml version="1.0" encoding="utf-8"?>
 <p:sld xmlns:a="http://schemas.openxmlformats.org/drawingml/2006/main" xmlns:r="http://schemas.openxmlformats.org/officeDocument/2006/relationships" xmlns:p="http://schemas.openxmlformats.org/presentationml/2006/main">
   <p:cSld>
     <p:spTree>
@@ -6384,10 +6645,10 @@
       </p:sp>
       <p:pic>
         <p:nvPicPr>
-          <p:cNvPr id="17" name="Picture 16">
-            <a:extLst>
-              <a:ext uri="{FF2B5EF4-FFF2-40B4-BE49-F238E27FC236}">
-                <a16:creationId xmlns:a16="http://schemas.microsoft.com/office/drawing/2014/main" id="{F90B856F-661A-49FA-83E3-66E91948E66B}"/>
+          <p:cNvPr id="5" name="Grafik 4">
+            <a:extLst>
+              <a:ext uri="{FF2B5EF4-FFF2-40B4-BE49-F238E27FC236}">
+                <a16:creationId xmlns:a16="http://schemas.microsoft.com/office/drawing/2014/main" id="{59FF4546-E864-44C8-ADA8-4181FE8ED8A0}"/>
               </a:ext>
             </a:extLst>
           </p:cNvPr>
@@ -6410,8 +6671,44 @@
         </p:blipFill>
         <p:spPr>
           <a:xfrm>
-            <a:off x="6505574" y="969028"/>
-            <a:ext cx="5024149" cy="5134908"/>
+            <a:off x="7409825" y="483302"/>
+            <a:ext cx="3353251" cy="2801191"/>
+          </a:xfrm>
+          <a:prstGeom prst="rect">
+            <a:avLst/>
+          </a:prstGeom>
+        </p:spPr>
+      </p:pic>
+      <p:pic>
+        <p:nvPicPr>
+          <p:cNvPr id="7" name="Grafik 6">
+            <a:extLst>
+              <a:ext uri="{FF2B5EF4-FFF2-40B4-BE49-F238E27FC236}">
+                <a16:creationId xmlns:a16="http://schemas.microsoft.com/office/drawing/2014/main" id="{FF300B16-BA57-4BC1-BA76-C7BA6AC75283}"/>
+              </a:ext>
+            </a:extLst>
+          </p:cNvPr>
+          <p:cNvPicPr>
+            <a:picLocks noChangeAspect="1"/>
+          </p:cNvPicPr>
+          <p:nvPr/>
+        </p:nvPicPr>
+        <p:blipFill>
+          <a:blip r:embed="rId3">
+            <a:extLst>
+              <a:ext uri="{28A0092B-C50C-407E-A947-70E740481C1C}">
+                <a14:useLocalDpi xmlns:a14="http://schemas.microsoft.com/office/drawing/2010/main" val="0"/>
+              </a:ext>
+            </a:extLst>
+          </a:blip>
+          <a:stretch>
+            <a:fillRect/>
+          </a:stretch>
+        </p:blipFill>
+        <p:spPr>
+          <a:xfrm>
+            <a:off x="7409825" y="3573508"/>
+            <a:ext cx="3353251" cy="2851288"/>
           </a:xfrm>
           <a:prstGeom prst="rect">
             <a:avLst/>
@@ -6450,10 +6747,48 @@
       </p:grpSpPr>
       <p:sp>
         <p:nvSpPr>
-          <p:cNvPr id="2" name="Titel 1">
-            <a:extLst>
-              <a:ext uri="{FF2B5EF4-FFF2-40B4-BE49-F238E27FC236}">
-                <a16:creationId xmlns:a16="http://schemas.microsoft.com/office/drawing/2014/main" id="{A142D5CF-260A-4E31-8A84-A4B77466BCE9}"/>
+          <p:cNvPr id="3" name="Inhaltsplatzhalter 2">
+            <a:extLst>
+              <a:ext uri="{FF2B5EF4-FFF2-40B4-BE49-F238E27FC236}">
+                <a16:creationId xmlns:a16="http://schemas.microsoft.com/office/drawing/2014/main" id="{A94D35EC-60EA-4AE0-93F0-D0FEFAFEFD0F}"/>
+              </a:ext>
+            </a:extLst>
+          </p:cNvPr>
+          <p:cNvSpPr>
+            <a:spLocks noGrp="1"/>
+          </p:cNvSpPr>
+          <p:nvPr>
+            <p:ph idx="1"/>
+          </p:nvPr>
+        </p:nvSpPr>
+        <p:spPr>
+          <a:xfrm>
+            <a:off x="838200" y="1825625"/>
+            <a:ext cx="10271882" cy="942975"/>
+          </a:xfrm>
+        </p:spPr>
+        <p:txBody>
+          <a:bodyPr/>
+          <a:lstStyle/>
+          <a:p>
+            <a:r>
+              <a:rPr lang="de-DE" dirty="0"/>
+              <a:t>Klassifikation mittels </a:t>
+            </a:r>
+            <a:r>
+              <a:rPr lang="de-DE" dirty="0" err="1"/>
+              <a:t>nearest-neighbour</a:t>
+            </a:r>
+            <a:endParaRPr lang="de-DE" dirty="0"/>
+          </a:p>
+        </p:txBody>
+      </p:sp>
+      <p:sp>
+        <p:nvSpPr>
+          <p:cNvPr id="4" name="Titel 1">
+            <a:extLst>
+              <a:ext uri="{FF2B5EF4-FFF2-40B4-BE49-F238E27FC236}">
+                <a16:creationId xmlns:a16="http://schemas.microsoft.com/office/drawing/2014/main" id="{1FEC4483-04FB-4FEE-B21B-C7E1B91F74DE}"/>
               </a:ext>
             </a:extLst>
           </p:cNvPr>
@@ -6464,33 +6799,36 @@
             <p:ph type="title"/>
           </p:nvPr>
         </p:nvSpPr>
-        <p:spPr/>
+        <p:spPr>
+          <a:xfrm>
+            <a:off x="838200" y="365125"/>
+            <a:ext cx="10515600" cy="1325563"/>
+          </a:xfrm>
+        </p:spPr>
         <p:txBody>
           <a:bodyPr/>
           <a:lstStyle/>
           <a:p>
             <a:r>
               <a:rPr lang="de-DE" dirty="0"/>
-              <a:t>CNN – Model (1)</a:t>
+              <a:t>Idee 2: X-Y-Projektion</a:t>
             </a:r>
           </a:p>
         </p:txBody>
       </p:sp>
       <p:pic>
         <p:nvPicPr>
-          <p:cNvPr id="9" name="Content Placeholder 8">
-            <a:extLst>
-              <a:ext uri="{FF2B5EF4-FFF2-40B4-BE49-F238E27FC236}">
-                <a16:creationId xmlns:a16="http://schemas.microsoft.com/office/drawing/2014/main" id="{9089E4B0-DA8C-411F-8E69-BF5D4BE493F0}"/>
+          <p:cNvPr id="6" name="Grafik 5">
+            <a:extLst>
+              <a:ext uri="{FF2B5EF4-FFF2-40B4-BE49-F238E27FC236}">
+                <a16:creationId xmlns:a16="http://schemas.microsoft.com/office/drawing/2014/main" id="{090EE3BD-4084-4A98-84A6-73E0D561144C}"/>
               </a:ext>
             </a:extLst>
           </p:cNvPr>
           <p:cNvPicPr>
-            <a:picLocks noGrp="1" noChangeAspect="1"/>
+            <a:picLocks noChangeAspect="1"/>
           </p:cNvPicPr>
-          <p:nvPr>
-            <p:ph idx="1"/>
-          </p:nvPr>
+          <p:nvPr/>
         </p:nvPicPr>
         <p:blipFill>
           <a:blip r:embed="rId2">
@@ -6506,15 +6844,210 @@
         </p:blipFill>
         <p:spPr>
           <a:xfrm>
-            <a:off x="838200" y="1548264"/>
-            <a:ext cx="8997530" cy="4351338"/>
-          </a:xfrm>
+            <a:off x="1081918" y="2581275"/>
+            <a:ext cx="2006071" cy="3911600"/>
+          </a:xfrm>
+          <a:prstGeom prst="rect">
+            <a:avLst/>
+          </a:prstGeom>
         </p:spPr>
       </p:pic>
+      <p:pic>
+        <p:nvPicPr>
+          <p:cNvPr id="8" name="Grafik 7">
+            <a:extLst>
+              <a:ext uri="{FF2B5EF4-FFF2-40B4-BE49-F238E27FC236}">
+                <a16:creationId xmlns:a16="http://schemas.microsoft.com/office/drawing/2014/main" id="{6273C689-49EC-4F6D-94D9-8876EA16DC8C}"/>
+              </a:ext>
+            </a:extLst>
+          </p:cNvPr>
+          <p:cNvPicPr>
+            <a:picLocks noChangeAspect="1"/>
+          </p:cNvPicPr>
+          <p:nvPr/>
+        </p:nvPicPr>
+        <p:blipFill>
+          <a:blip r:embed="rId3">
+            <a:extLst>
+              <a:ext uri="{28A0092B-C50C-407E-A947-70E740481C1C}">
+                <a14:useLocalDpi xmlns:a14="http://schemas.microsoft.com/office/drawing/2010/main" val="0"/>
+              </a:ext>
+            </a:extLst>
+          </a:blip>
+          <a:stretch>
+            <a:fillRect/>
+          </a:stretch>
+        </p:blipFill>
+        <p:spPr>
+          <a:xfrm>
+            <a:off x="3398405" y="2581275"/>
+            <a:ext cx="1982649" cy="3911600"/>
+          </a:xfrm>
+          <a:prstGeom prst="rect">
+            <a:avLst/>
+          </a:prstGeom>
+        </p:spPr>
+      </p:pic>
+      <p:pic>
+        <p:nvPicPr>
+          <p:cNvPr id="10" name="Grafik 9">
+            <a:extLst>
+              <a:ext uri="{FF2B5EF4-FFF2-40B4-BE49-F238E27FC236}">
+                <a16:creationId xmlns:a16="http://schemas.microsoft.com/office/drawing/2014/main" id="{3262AA7F-58C2-4DD7-AD34-CA78F9C87653}"/>
+              </a:ext>
+            </a:extLst>
+          </p:cNvPr>
+          <p:cNvPicPr>
+            <a:picLocks noChangeAspect="1"/>
+          </p:cNvPicPr>
+          <p:nvPr/>
+        </p:nvPicPr>
+        <p:blipFill>
+          <a:blip r:embed="rId4">
+            <a:extLst>
+              <a:ext uri="{28A0092B-C50C-407E-A947-70E740481C1C}">
+                <a14:useLocalDpi xmlns:a14="http://schemas.microsoft.com/office/drawing/2010/main" val="0"/>
+              </a:ext>
+            </a:extLst>
+          </a:blip>
+          <a:stretch>
+            <a:fillRect/>
+          </a:stretch>
+        </p:blipFill>
+        <p:spPr>
+          <a:xfrm>
+            <a:off x="8503897" y="2581274"/>
+            <a:ext cx="2036346" cy="3911601"/>
+          </a:xfrm>
+          <a:prstGeom prst="rect">
+            <a:avLst/>
+          </a:prstGeom>
+        </p:spPr>
+      </p:pic>
+      <p:sp>
+        <p:nvSpPr>
+          <p:cNvPr id="11" name="Textfeld 10">
+            <a:extLst>
+              <a:ext uri="{FF2B5EF4-FFF2-40B4-BE49-F238E27FC236}">
+                <a16:creationId xmlns:a16="http://schemas.microsoft.com/office/drawing/2014/main" id="{73F67700-2F35-454C-8712-9B1C537352E0}"/>
+              </a:ext>
+            </a:extLst>
+          </p:cNvPr>
+          <p:cNvSpPr txBox="1"/>
+          <p:nvPr/>
+        </p:nvSpPr>
+        <p:spPr>
+          <a:xfrm>
+            <a:off x="5691471" y="2790825"/>
+            <a:ext cx="2719104" cy="923330"/>
+          </a:xfrm>
+          <a:prstGeom prst="rect">
+            <a:avLst/>
+          </a:prstGeom>
+          <a:noFill/>
+        </p:spPr>
+        <p:txBody>
+          <a:bodyPr wrap="square" rtlCol="0">
+            <a:spAutoFit/>
+          </a:bodyPr>
+          <a:lstStyle/>
+          <a:p>
+            <a:r>
+              <a:rPr lang="de-DE" dirty="0">
+                <a:sym typeface="Wingdings" panose="05000000000000000000" pitchFamily="2" charset="2"/>
+              </a:rPr>
+              <a:t> Korrekte Klassifizierung und der dazugehörige nächste Nachbar</a:t>
+            </a:r>
+            <a:endParaRPr lang="de-DE" dirty="0"/>
+          </a:p>
+        </p:txBody>
+      </p:sp>
+      <p:sp>
+        <p:nvSpPr>
+          <p:cNvPr id="12" name="Textfeld 11">
+            <a:extLst>
+              <a:ext uri="{FF2B5EF4-FFF2-40B4-BE49-F238E27FC236}">
+                <a16:creationId xmlns:a16="http://schemas.microsoft.com/office/drawing/2014/main" id="{DE2AF300-AD79-4F5D-A5E7-E3E11C5525B3}"/>
+              </a:ext>
+            </a:extLst>
+          </p:cNvPr>
+          <p:cNvSpPr txBox="1"/>
+          <p:nvPr/>
+        </p:nvSpPr>
+        <p:spPr>
+          <a:xfrm>
+            <a:off x="5691470" y="3971925"/>
+            <a:ext cx="2719103" cy="923330"/>
+          </a:xfrm>
+          <a:prstGeom prst="rect">
+            <a:avLst/>
+          </a:prstGeom>
+          <a:noFill/>
+        </p:spPr>
+        <p:txBody>
+          <a:bodyPr wrap="square" rtlCol="0">
+            <a:spAutoFit/>
+          </a:bodyPr>
+          <a:lstStyle/>
+          <a:p>
+            <a:r>
+              <a:rPr lang="de-DE" dirty="0">
+                <a:sym typeface="Wingdings" panose="05000000000000000000" pitchFamily="2" charset="2"/>
+              </a:rPr>
+              <a:t>Falsche Klassifizierung und der dazugehörige nächste Nachbar		</a:t>
+            </a:r>
+            <a:endParaRPr lang="de-DE" dirty="0"/>
+          </a:p>
+        </p:txBody>
+      </p:sp>
+      <p:sp>
+        <p:nvSpPr>
+          <p:cNvPr id="13" name="Textfeld 12">
+            <a:extLst>
+              <a:ext uri="{FF2B5EF4-FFF2-40B4-BE49-F238E27FC236}">
+                <a16:creationId xmlns:a16="http://schemas.microsoft.com/office/drawing/2014/main" id="{EB67B971-BDD6-4814-9B84-935E19523FBF}"/>
+              </a:ext>
+            </a:extLst>
+          </p:cNvPr>
+          <p:cNvSpPr txBox="1"/>
+          <p:nvPr/>
+        </p:nvSpPr>
+        <p:spPr>
+          <a:xfrm>
+            <a:off x="5691470" y="5127626"/>
+            <a:ext cx="2719103" cy="1200329"/>
+          </a:xfrm>
+          <a:prstGeom prst="rect">
+            <a:avLst/>
+          </a:prstGeom>
+          <a:noFill/>
+        </p:spPr>
+        <p:txBody>
+          <a:bodyPr wrap="square" rtlCol="0">
+            <a:spAutoFit/>
+          </a:bodyPr>
+          <a:lstStyle/>
+          <a:p>
+            <a:r>
+              <a:rPr lang="de-DE" dirty="0">
+                <a:sym typeface="Wingdings" panose="05000000000000000000" pitchFamily="2" charset="2"/>
+              </a:rPr>
+              <a:t> Klassifizierung mittel KNN ergab keine merkbare Verbesserung im </a:t>
+            </a:r>
+            <a:r>
+              <a:rPr lang="de-DE" dirty="0" err="1">
+                <a:sym typeface="Wingdings" panose="05000000000000000000" pitchFamily="2" charset="2"/>
+              </a:rPr>
+              <a:t>Gesamtergebniss</a:t>
+            </a:r>
+            <a:endParaRPr lang="de-DE" dirty="0"/>
+          </a:p>
+        </p:txBody>
+      </p:sp>
     </p:spTree>
     <p:extLst>
       <p:ext uri="{BB962C8B-B14F-4D97-AF65-F5344CB8AC3E}">
-        <p14:creationId xmlns:p14="http://schemas.microsoft.com/office/powerpoint/2010/main" val="1459254845"/>
+        <p14:creationId xmlns:p14="http://schemas.microsoft.com/office/powerpoint/2010/main" val="3657530707"/>
       </p:ext>
     </p:extLst>
   </p:cSld>
@@ -6564,7 +7097,7 @@
           <a:p>
             <a:r>
               <a:rPr lang="de-DE" dirty="0"/>
-              <a:t>CNN – Model (2)</a:t>
+              <a:t>CNN – Model (1)</a:t>
             </a:r>
           </a:p>
         </p:txBody>
@@ -6604,126 +7137,10 @@
           </a:xfrm>
         </p:spPr>
       </p:pic>
-      <p:sp>
-        <p:nvSpPr>
-          <p:cNvPr id="3" name="TextBox 2">
-            <a:extLst>
-              <a:ext uri="{FF2B5EF4-FFF2-40B4-BE49-F238E27FC236}">
-                <a16:creationId xmlns:a16="http://schemas.microsoft.com/office/drawing/2014/main" id="{5CC2C52F-4ED9-4A12-B2E4-7EC613C50DC7}"/>
-              </a:ext>
-            </a:extLst>
-          </p:cNvPr>
-          <p:cNvSpPr txBox="1"/>
-          <p:nvPr/>
-        </p:nvSpPr>
-        <p:spPr>
-          <a:xfrm>
-            <a:off x="9835730" y="1461775"/>
-            <a:ext cx="2027980" cy="954107"/>
-          </a:xfrm>
-          <a:prstGeom prst="rect">
-            <a:avLst/>
-          </a:prstGeom>
-          <a:noFill/>
-        </p:spPr>
-        <p:txBody>
-          <a:bodyPr wrap="square" rtlCol="0">
-            <a:spAutoFit/>
-          </a:bodyPr>
-          <a:lstStyle/>
-          <a:p>
-            <a:pPr algn="ctr"/>
-            <a:r>
-              <a:rPr lang="en-US" sz="2800" b="1" dirty="0"/>
-              <a:t>Activation:</a:t>
-            </a:r>
-          </a:p>
-          <a:p>
-            <a:pPr algn="ctr"/>
-            <a:r>
-              <a:rPr lang="en-US" sz="2800" b="1" dirty="0" err="1"/>
-              <a:t>ReLu</a:t>
-            </a:r>
-            <a:endParaRPr lang="en-US" sz="2800" b="1" dirty="0"/>
-          </a:p>
-        </p:txBody>
-      </p:sp>
-      <p:sp>
-        <p:nvSpPr>
-          <p:cNvPr id="5" name="TextBox 4">
-            <a:extLst>
-              <a:ext uri="{FF2B5EF4-FFF2-40B4-BE49-F238E27FC236}">
-                <a16:creationId xmlns:a16="http://schemas.microsoft.com/office/drawing/2014/main" id="{1BB7B357-BCF7-4BE1-BBE1-55FD9976234E}"/>
-              </a:ext>
-            </a:extLst>
-          </p:cNvPr>
-          <p:cNvSpPr txBox="1"/>
-          <p:nvPr/>
-        </p:nvSpPr>
-        <p:spPr>
-          <a:xfrm>
-            <a:off x="10396134" y="3723933"/>
-            <a:ext cx="907171" cy="523220"/>
-          </a:xfrm>
-          <a:prstGeom prst="rect">
-            <a:avLst/>
-          </a:prstGeom>
-          <a:noFill/>
-        </p:spPr>
-        <p:txBody>
-          <a:bodyPr wrap="none" rtlCol="0">
-            <a:spAutoFit/>
-          </a:bodyPr>
-          <a:lstStyle/>
-          <a:p>
-            <a:r>
-              <a:rPr lang="en-US" sz="2800" b="1" dirty="0" err="1"/>
-              <a:t>ReLu</a:t>
-            </a:r>
-            <a:endParaRPr lang="en-US" sz="2800" b="1" dirty="0"/>
-          </a:p>
-        </p:txBody>
-      </p:sp>
-      <p:sp>
-        <p:nvSpPr>
-          <p:cNvPr id="6" name="TextBox 5">
-            <a:extLst>
-              <a:ext uri="{FF2B5EF4-FFF2-40B4-BE49-F238E27FC236}">
-                <a16:creationId xmlns:a16="http://schemas.microsoft.com/office/drawing/2014/main" id="{EF823A2D-499E-4375-8E83-7E51B079822B}"/>
-              </a:ext>
-            </a:extLst>
-          </p:cNvPr>
-          <p:cNvSpPr txBox="1"/>
-          <p:nvPr/>
-        </p:nvSpPr>
-        <p:spPr>
-          <a:xfrm>
-            <a:off x="10141095" y="5134615"/>
-            <a:ext cx="1417247" cy="523220"/>
-          </a:xfrm>
-          <a:prstGeom prst="rect">
-            <a:avLst/>
-          </a:prstGeom>
-          <a:noFill/>
-        </p:spPr>
-        <p:txBody>
-          <a:bodyPr wrap="none" rtlCol="0">
-            <a:spAutoFit/>
-          </a:bodyPr>
-          <a:lstStyle/>
-          <a:p>
-            <a:r>
-              <a:rPr lang="en-US" sz="2800" b="1" dirty="0" err="1"/>
-              <a:t>Softmax</a:t>
-            </a:r>
-            <a:endParaRPr lang="en-US" sz="2800" b="1" dirty="0"/>
-          </a:p>
-        </p:txBody>
-      </p:sp>
     </p:spTree>
     <p:extLst>
       <p:ext uri="{BB962C8B-B14F-4D97-AF65-F5344CB8AC3E}">
-        <p14:creationId xmlns:p14="http://schemas.microsoft.com/office/powerpoint/2010/main" val="3048087049"/>
+        <p14:creationId xmlns:p14="http://schemas.microsoft.com/office/powerpoint/2010/main" val="1459254845"/>
       </p:ext>
     </p:extLst>
   </p:cSld>
@@ -6755,7 +7172,7 @@
           <p:cNvPr id="2" name="Titel 1">
             <a:extLst>
               <a:ext uri="{FF2B5EF4-FFF2-40B4-BE49-F238E27FC236}">
-                <a16:creationId xmlns:a16="http://schemas.microsoft.com/office/drawing/2014/main" id="{0039F296-496E-47DA-87A9-572B69EE1ED2}"/>
+                <a16:creationId xmlns:a16="http://schemas.microsoft.com/office/drawing/2014/main" id="{A142D5CF-260A-4E31-8A84-A4B77466BCE9}"/>
               </a:ext>
             </a:extLst>
           </p:cNvPr>
@@ -6773,154 +7190,26 @@
           <a:p>
             <a:r>
               <a:rPr lang="de-DE" dirty="0"/>
-              <a:t>CNN- Parameter (am Ende)</a:t>
-            </a:r>
-          </a:p>
-        </p:txBody>
-      </p:sp>
-      <p:sp>
-        <p:nvSpPr>
-          <p:cNvPr id="3" name="Inhaltsplatzhalter 2">
-            <a:extLst>
-              <a:ext uri="{FF2B5EF4-FFF2-40B4-BE49-F238E27FC236}">
-                <a16:creationId xmlns:a16="http://schemas.microsoft.com/office/drawing/2014/main" id="{3D0E6730-2CE6-4570-95E1-BCB41F33AEB7}"/>
-              </a:ext>
-            </a:extLst>
-          </p:cNvPr>
-          <p:cNvSpPr>
-            <a:spLocks noGrp="1"/>
-          </p:cNvSpPr>
-          <p:nvPr>
-            <p:ph idx="1"/>
-          </p:nvPr>
-        </p:nvSpPr>
-        <p:spPr/>
-        <p:txBody>
-          <a:bodyPr/>
-          <a:lstStyle/>
-          <a:p>
-            <a:r>
-              <a:rPr lang="de-DE" dirty="0"/>
-              <a:t>Loss: Categorical Crossentropy</a:t>
-            </a:r>
-          </a:p>
-          <a:p>
-            <a:r>
-              <a:rPr lang="de-DE" dirty="0"/>
-              <a:t>Optimizer: SGD</a:t>
-            </a:r>
-          </a:p>
-          <a:p>
-            <a:r>
-              <a:rPr lang="de-DE" dirty="0"/>
-              <a:t>Learning Rate: 0.01</a:t>
-            </a:r>
-          </a:p>
-          <a:p>
-            <a:endParaRPr lang="de-DE" dirty="0"/>
-          </a:p>
-          <a:p>
-            <a:r>
-              <a:rPr lang="de-DE" dirty="0"/>
-              <a:t>Input Size: 2000 je Klasse</a:t>
-            </a:r>
-          </a:p>
-          <a:p>
-            <a:r>
-              <a:rPr lang="de-DE" dirty="0"/>
-              <a:t>Validation Split: 80:20</a:t>
-            </a:r>
-          </a:p>
-          <a:p>
-            <a:r>
-              <a:rPr lang="de-DE" dirty="0"/>
-              <a:t>Batch Size: 32</a:t>
-            </a:r>
-          </a:p>
-          <a:p>
-            <a:r>
-              <a:rPr lang="de-DE" dirty="0"/>
-              <a:t>Epochen: 200</a:t>
-            </a:r>
-          </a:p>
-          <a:p>
-            <a:endParaRPr lang="de-DE" dirty="0"/>
-          </a:p>
-        </p:txBody>
-      </p:sp>
-      <p:sp>
-        <p:nvSpPr>
-          <p:cNvPr id="6" name="TextBox 5">
-            <a:extLst>
-              <a:ext uri="{FF2B5EF4-FFF2-40B4-BE49-F238E27FC236}">
-                <a16:creationId xmlns:a16="http://schemas.microsoft.com/office/drawing/2014/main" id="{A8D97ADF-2896-4CB5-9406-AC15E0A51683}"/>
-              </a:ext>
-            </a:extLst>
-          </p:cNvPr>
-          <p:cNvSpPr txBox="1"/>
-          <p:nvPr/>
-        </p:nvSpPr>
-        <p:spPr>
-          <a:xfrm>
-            <a:off x="838200" y="6311900"/>
-            <a:ext cx="10934700" cy="369332"/>
-          </a:xfrm>
-          <a:prstGeom prst="rect">
-            <a:avLst/>
-          </a:prstGeom>
-          <a:noFill/>
-        </p:spPr>
-        <p:txBody>
-          <a:bodyPr wrap="square" rtlCol="0">
-            <a:spAutoFit/>
-          </a:bodyPr>
-          <a:lstStyle/>
-          <a:p>
-            <a:r>
-              <a:rPr lang="en-US" dirty="0" err="1"/>
-              <a:t>Bildausschnitt</a:t>
-            </a:r>
-            <a:r>
-              <a:rPr lang="en-US" dirty="0"/>
-              <a:t> (</a:t>
-            </a:r>
-            <a:r>
-              <a:rPr lang="en-US" dirty="0" err="1"/>
-              <a:t>oben</a:t>
-            </a:r>
-            <a:r>
-              <a:rPr lang="en-US" dirty="0"/>
-              <a:t>): http://</a:t>
-            </a:r>
-            <a:r>
-              <a:rPr lang="en-US" dirty="0" err="1"/>
-              <a:t>neuronus.com</a:t>
-            </a:r>
-            <a:r>
-              <a:rPr lang="en-US" dirty="0"/>
-              <a:t>/images/news/2017_04/</a:t>
-            </a:r>
-            <a:r>
-              <a:rPr lang="en-US" dirty="0" err="1"/>
-              <a:t>4ff3daca463adbb35a3b725bccf05273.png</a:t>
-            </a:r>
-            <a:endParaRPr lang="en-US" dirty="0"/>
+              <a:t>CNN – Model (2)</a:t>
+            </a:r>
           </a:p>
         </p:txBody>
       </p:sp>
       <p:pic>
         <p:nvPicPr>
-          <p:cNvPr id="8" name="Picture 7">
-            <a:extLst>
-              <a:ext uri="{FF2B5EF4-FFF2-40B4-BE49-F238E27FC236}">
-                <a16:creationId xmlns:a16="http://schemas.microsoft.com/office/drawing/2014/main" id="{950CC0A6-9AE0-4CEE-AA66-AE4A8C6D60A2}"/>
+          <p:cNvPr id="9" name="Content Placeholder 8">
+            <a:extLst>
+              <a:ext uri="{FF2B5EF4-FFF2-40B4-BE49-F238E27FC236}">
+                <a16:creationId xmlns:a16="http://schemas.microsoft.com/office/drawing/2014/main" id="{9089E4B0-DA8C-411F-8E69-BF5D4BE493F0}"/>
               </a:ext>
             </a:extLst>
           </p:cNvPr>
           <p:cNvPicPr>
-            <a:picLocks noChangeAspect="1"/>
+            <a:picLocks noGrp="1" noChangeAspect="1"/>
           </p:cNvPicPr>
-          <p:nvPr/>
+          <p:nvPr>
+            <p:ph idx="1"/>
+          </p:nvPr>
         </p:nvPicPr>
         <p:blipFill>
           <a:blip r:embed="rId2">
@@ -6936,54 +7225,131 @@
         </p:blipFill>
         <p:spPr>
           <a:xfrm>
-            <a:off x="6096000" y="1694442"/>
-            <a:ext cx="5676900" cy="2001258"/>
+            <a:off x="838200" y="1548264"/>
+            <a:ext cx="8997530" cy="4351338"/>
+          </a:xfrm>
+        </p:spPr>
+      </p:pic>
+      <p:sp>
+        <p:nvSpPr>
+          <p:cNvPr id="3" name="TextBox 2">
+            <a:extLst>
+              <a:ext uri="{FF2B5EF4-FFF2-40B4-BE49-F238E27FC236}">
+                <a16:creationId xmlns:a16="http://schemas.microsoft.com/office/drawing/2014/main" id="{5CC2C52F-4ED9-4A12-B2E4-7EC613C50DC7}"/>
+              </a:ext>
+            </a:extLst>
+          </p:cNvPr>
+          <p:cNvSpPr txBox="1"/>
+          <p:nvPr/>
+        </p:nvSpPr>
+        <p:spPr>
+          <a:xfrm>
+            <a:off x="9835730" y="1461775"/>
+            <a:ext cx="2027980" cy="954107"/>
           </a:xfrm>
           <a:prstGeom prst="rect">
             <a:avLst/>
           </a:prstGeom>
-        </p:spPr>
-      </p:pic>
-      <p:pic>
-        <p:nvPicPr>
-          <p:cNvPr id="10" name="Picture 9">
-            <a:extLst>
-              <a:ext uri="{FF2B5EF4-FFF2-40B4-BE49-F238E27FC236}">
-                <a16:creationId xmlns:a16="http://schemas.microsoft.com/office/drawing/2014/main" id="{5F4F9473-0ECA-4048-81C6-54CB1986CB7B}"/>
-              </a:ext>
-            </a:extLst>
-          </p:cNvPr>
-          <p:cNvPicPr>
-            <a:picLocks noChangeAspect="1"/>
-          </p:cNvPicPr>
+          <a:noFill/>
+        </p:spPr>
+        <p:txBody>
+          <a:bodyPr wrap="square" rtlCol="0">
+            <a:spAutoFit/>
+          </a:bodyPr>
+          <a:lstStyle/>
+          <a:p>
+            <a:pPr algn="ctr"/>
+            <a:r>
+              <a:rPr lang="en-US" sz="2800" b="1" dirty="0"/>
+              <a:t>Activation:</a:t>
+            </a:r>
+          </a:p>
+          <a:p>
+            <a:pPr algn="ctr"/>
+            <a:r>
+              <a:rPr lang="en-US" sz="2800" b="1" dirty="0" err="1"/>
+              <a:t>ReLu</a:t>
+            </a:r>
+            <a:endParaRPr lang="en-US" sz="2800" b="1" dirty="0"/>
+          </a:p>
+        </p:txBody>
+      </p:sp>
+      <p:sp>
+        <p:nvSpPr>
+          <p:cNvPr id="5" name="TextBox 4">
+            <a:extLst>
+              <a:ext uri="{FF2B5EF4-FFF2-40B4-BE49-F238E27FC236}">
+                <a16:creationId xmlns:a16="http://schemas.microsoft.com/office/drawing/2014/main" id="{1BB7B357-BCF7-4BE1-BBE1-55FD9976234E}"/>
+              </a:ext>
+            </a:extLst>
+          </p:cNvPr>
+          <p:cNvSpPr txBox="1"/>
           <p:nvPr/>
-        </p:nvPicPr>
-        <p:blipFill>
-          <a:blip r:embed="rId3">
-            <a:extLst>
-              <a:ext uri="{28A0092B-C50C-407E-A947-70E740481C1C}">
-                <a14:useLocalDpi xmlns:a14="http://schemas.microsoft.com/office/drawing/2010/main" val="0"/>
-              </a:ext>
-            </a:extLst>
-          </a:blip>
-          <a:stretch>
-            <a:fillRect/>
-          </a:stretch>
-        </p:blipFill>
+        </p:nvSpPr>
         <p:spPr>
           <a:xfrm>
-            <a:off x="5396610" y="4306888"/>
-            <a:ext cx="6027040" cy="1544819"/>
+            <a:off x="10396134" y="3723933"/>
+            <a:ext cx="907171" cy="523220"/>
           </a:xfrm>
           <a:prstGeom prst="rect">
             <a:avLst/>
           </a:prstGeom>
-        </p:spPr>
-      </p:pic>
+          <a:noFill/>
+        </p:spPr>
+        <p:txBody>
+          <a:bodyPr wrap="none" rtlCol="0">
+            <a:spAutoFit/>
+          </a:bodyPr>
+          <a:lstStyle/>
+          <a:p>
+            <a:r>
+              <a:rPr lang="en-US" sz="2800" b="1" dirty="0" err="1"/>
+              <a:t>ReLu</a:t>
+            </a:r>
+            <a:endParaRPr lang="en-US" sz="2800" b="1" dirty="0"/>
+          </a:p>
+        </p:txBody>
+      </p:sp>
+      <p:sp>
+        <p:nvSpPr>
+          <p:cNvPr id="6" name="TextBox 5">
+            <a:extLst>
+              <a:ext uri="{FF2B5EF4-FFF2-40B4-BE49-F238E27FC236}">
+                <a16:creationId xmlns:a16="http://schemas.microsoft.com/office/drawing/2014/main" id="{EF823A2D-499E-4375-8E83-7E51B079822B}"/>
+              </a:ext>
+            </a:extLst>
+          </p:cNvPr>
+          <p:cNvSpPr txBox="1"/>
+          <p:nvPr/>
+        </p:nvSpPr>
+        <p:spPr>
+          <a:xfrm>
+            <a:off x="10141095" y="5134615"/>
+            <a:ext cx="1417247" cy="523220"/>
+          </a:xfrm>
+          <a:prstGeom prst="rect">
+            <a:avLst/>
+          </a:prstGeom>
+          <a:noFill/>
+        </p:spPr>
+        <p:txBody>
+          <a:bodyPr wrap="none" rtlCol="0">
+            <a:spAutoFit/>
+          </a:bodyPr>
+          <a:lstStyle/>
+          <a:p>
+            <a:r>
+              <a:rPr lang="en-US" sz="2800" b="1" dirty="0" err="1"/>
+              <a:t>Softmax</a:t>
+            </a:r>
+            <a:endParaRPr lang="en-US" sz="2800" b="1" dirty="0"/>
+          </a:p>
+        </p:txBody>
+      </p:sp>
     </p:spTree>
     <p:extLst>
       <p:ext uri="{BB962C8B-B14F-4D97-AF65-F5344CB8AC3E}">
-        <p14:creationId xmlns:p14="http://schemas.microsoft.com/office/powerpoint/2010/main" val="1818316990"/>
+        <p14:creationId xmlns:p14="http://schemas.microsoft.com/office/powerpoint/2010/main" val="3048087049"/>
       </p:ext>
     </p:extLst>
   </p:cSld>

</xml_diff>

<commit_message>
added stuff to the presentation
</commit_message>
<xml_diff>
--- a/project/Präsentation CV-Prak [Di].pptx
+++ b/project/Präsentation CV-Prak [Di].pptx
@@ -212,7 +212,7 @@
           <a:p>
             <a:fld id="{97594BE3-3CDC-4DC8-95E7-951CD3F6E10A}" type="datetimeFigureOut">
               <a:rPr lang="de-DE" smtClean="0"/>
-              <a:t>10.07.2018</a:t>
+              <a:t>11.07.2018</a:t>
             </a:fld>
             <a:endParaRPr lang="de-DE"/>
           </a:p>
@@ -710,7 +710,7 @@
           <a:p>
             <a:fld id="{3F86B6B5-3B37-4848-B40E-22A2A7CEFEDD}" type="datetimeFigureOut">
               <a:rPr lang="de-DE" smtClean="0"/>
-              <a:t>10.07.2018</a:t>
+              <a:t>11.07.2018</a:t>
             </a:fld>
             <a:endParaRPr lang="de-DE"/>
           </a:p>
@@ -908,7 +908,7 @@
           <a:p>
             <a:fld id="{3F86B6B5-3B37-4848-B40E-22A2A7CEFEDD}" type="datetimeFigureOut">
               <a:rPr lang="de-DE" smtClean="0"/>
-              <a:t>10.07.2018</a:t>
+              <a:t>11.07.2018</a:t>
             </a:fld>
             <a:endParaRPr lang="de-DE"/>
           </a:p>
@@ -1116,7 +1116,7 @@
           <a:p>
             <a:fld id="{3F86B6B5-3B37-4848-B40E-22A2A7CEFEDD}" type="datetimeFigureOut">
               <a:rPr lang="de-DE" smtClean="0"/>
-              <a:t>10.07.2018</a:t>
+              <a:t>11.07.2018</a:t>
             </a:fld>
             <a:endParaRPr lang="de-DE"/>
           </a:p>
@@ -1314,7 +1314,7 @@
           <a:p>
             <a:fld id="{3F86B6B5-3B37-4848-B40E-22A2A7CEFEDD}" type="datetimeFigureOut">
               <a:rPr lang="de-DE" smtClean="0"/>
-              <a:t>10.07.2018</a:t>
+              <a:t>11.07.2018</a:t>
             </a:fld>
             <a:endParaRPr lang="de-DE"/>
           </a:p>
@@ -1589,7 +1589,7 @@
           <a:p>
             <a:fld id="{3F86B6B5-3B37-4848-B40E-22A2A7CEFEDD}" type="datetimeFigureOut">
               <a:rPr lang="de-DE" smtClean="0"/>
-              <a:t>10.07.2018</a:t>
+              <a:t>11.07.2018</a:t>
             </a:fld>
             <a:endParaRPr lang="de-DE"/>
           </a:p>
@@ -1854,7 +1854,7 @@
           <a:p>
             <a:fld id="{3F86B6B5-3B37-4848-B40E-22A2A7CEFEDD}" type="datetimeFigureOut">
               <a:rPr lang="de-DE" smtClean="0"/>
-              <a:t>10.07.2018</a:t>
+              <a:t>11.07.2018</a:t>
             </a:fld>
             <a:endParaRPr lang="de-DE"/>
           </a:p>
@@ -2266,7 +2266,7 @@
           <a:p>
             <a:fld id="{3F86B6B5-3B37-4848-B40E-22A2A7CEFEDD}" type="datetimeFigureOut">
               <a:rPr lang="de-DE" smtClean="0"/>
-              <a:t>10.07.2018</a:t>
+              <a:t>11.07.2018</a:t>
             </a:fld>
             <a:endParaRPr lang="de-DE"/>
           </a:p>
@@ -2407,7 +2407,7 @@
           <a:p>
             <a:fld id="{3F86B6B5-3B37-4848-B40E-22A2A7CEFEDD}" type="datetimeFigureOut">
               <a:rPr lang="de-DE" smtClean="0"/>
-              <a:t>10.07.2018</a:t>
+              <a:t>11.07.2018</a:t>
             </a:fld>
             <a:endParaRPr lang="de-DE"/>
           </a:p>
@@ -2520,7 +2520,7 @@
           <a:p>
             <a:fld id="{3F86B6B5-3B37-4848-B40E-22A2A7CEFEDD}" type="datetimeFigureOut">
               <a:rPr lang="de-DE" smtClean="0"/>
-              <a:t>10.07.2018</a:t>
+              <a:t>11.07.2018</a:t>
             </a:fld>
             <a:endParaRPr lang="de-DE"/>
           </a:p>
@@ -2831,7 +2831,7 @@
           <a:p>
             <a:fld id="{3F86B6B5-3B37-4848-B40E-22A2A7CEFEDD}" type="datetimeFigureOut">
               <a:rPr lang="de-DE" smtClean="0"/>
-              <a:t>10.07.2018</a:t>
+              <a:t>11.07.2018</a:t>
             </a:fld>
             <a:endParaRPr lang="de-DE"/>
           </a:p>
@@ -3119,7 +3119,7 @@
           <a:p>
             <a:fld id="{3F86B6B5-3B37-4848-B40E-22A2A7CEFEDD}" type="datetimeFigureOut">
               <a:rPr lang="de-DE" smtClean="0"/>
-              <a:t>10.07.2018</a:t>
+              <a:t>11.07.2018</a:t>
             </a:fld>
             <a:endParaRPr lang="de-DE"/>
           </a:p>
@@ -3360,7 +3360,7 @@
           <a:p>
             <a:fld id="{3F86B6B5-3B37-4848-B40E-22A2A7CEFEDD}" type="datetimeFigureOut">
               <a:rPr lang="de-DE" smtClean="0"/>
-              <a:t>10.07.2018</a:t>
+              <a:t>11.07.2018</a:t>
             </a:fld>
             <a:endParaRPr lang="de-DE"/>
           </a:p>
@@ -3936,7 +3936,7 @@
           <a:p>
             <a:r>
               <a:rPr lang="de-DE" dirty="0"/>
-              <a:t>CNN- Parameter (am Ende)</a:t>
+              <a:t>CNN - Parameter (am Ende)</a:t>
             </a:r>
           </a:p>
         </p:txBody>
@@ -4196,7 +4196,7 @@
           <a:p>
             <a:r>
               <a:rPr lang="de-DE" dirty="0"/>
-              <a:t>CNN- Probleme &amp; Optimierung</a:t>
+              <a:t>CNN - Probleme &amp; Optimierung</a:t>
             </a:r>
           </a:p>
         </p:txBody>
@@ -4398,24 +4398,515 @@
             <p:ph idx="1"/>
           </p:nvPr>
         </p:nvSpPr>
-        <p:spPr/>
+        <p:spPr>
+          <a:xfrm>
+            <a:off x="1446573" y="1783154"/>
+            <a:ext cx="9098388" cy="590739"/>
+          </a:xfrm>
+        </p:spPr>
         <p:txBody>
           <a:bodyPr/>
           <a:lstStyle/>
           <a:p>
             <a:r>
               <a:rPr lang="de-DE" dirty="0"/>
-              <a:t>Validierung: ~97% Accuracy</a:t>
-            </a:r>
-          </a:p>
-          <a:p>
+              <a:t>Validierung: ~97% </a:t>
+            </a:r>
+            <a:r>
+              <a:rPr lang="de-DE" dirty="0" err="1"/>
+              <a:t>Accuracy</a:t>
+            </a:r>
             <a:r>
               <a:rPr lang="de-DE" dirty="0"/>
-              <a:t>Test: eher dürftig</a:t>
+              <a:t>	||         Test: eher dürftig</a:t>
             </a:r>
           </a:p>
           <a:p>
             <a:endParaRPr lang="de-DE" dirty="0"/>
+          </a:p>
+        </p:txBody>
+      </p:sp>
+      <p:pic>
+        <p:nvPicPr>
+          <p:cNvPr id="5" name="Grafik 4">
+            <a:extLst>
+              <a:ext uri="{FF2B5EF4-FFF2-40B4-BE49-F238E27FC236}">
+                <a16:creationId xmlns:a16="http://schemas.microsoft.com/office/drawing/2014/main" id="{C69492F9-7C88-4E99-B33A-1962A9F2D752}"/>
+              </a:ext>
+            </a:extLst>
+          </p:cNvPr>
+          <p:cNvPicPr>
+            <a:picLocks noChangeAspect="1"/>
+          </p:cNvPicPr>
+          <p:nvPr/>
+        </p:nvPicPr>
+        <p:blipFill>
+          <a:blip r:embed="rId2">
+            <a:extLst>
+              <a:ext uri="{28A0092B-C50C-407E-A947-70E740481C1C}">
+                <a14:useLocalDpi xmlns:a14="http://schemas.microsoft.com/office/drawing/2010/main" val="0"/>
+              </a:ext>
+            </a:extLst>
+          </a:blip>
+          <a:stretch>
+            <a:fillRect/>
+          </a:stretch>
+        </p:blipFill>
+        <p:spPr>
+          <a:xfrm>
+            <a:off x="1362074" y="2885768"/>
+            <a:ext cx="4243893" cy="3607107"/>
+          </a:xfrm>
+          <a:prstGeom prst="rect">
+            <a:avLst/>
+          </a:prstGeom>
+        </p:spPr>
+      </p:pic>
+      <p:pic>
+        <p:nvPicPr>
+          <p:cNvPr id="9" name="Grafik 8">
+            <a:extLst>
+              <a:ext uri="{FF2B5EF4-FFF2-40B4-BE49-F238E27FC236}">
+                <a16:creationId xmlns:a16="http://schemas.microsoft.com/office/drawing/2014/main" id="{CC763271-8892-449A-90F0-5B40937FD5FC}"/>
+              </a:ext>
+            </a:extLst>
+          </p:cNvPr>
+          <p:cNvPicPr>
+            <a:picLocks noChangeAspect="1"/>
+          </p:cNvPicPr>
+          <p:nvPr/>
+        </p:nvPicPr>
+        <p:blipFill>
+          <a:blip r:embed="rId3">
+            <a:extLst>
+              <a:ext uri="{28A0092B-C50C-407E-A947-70E740481C1C}">
+                <a14:useLocalDpi xmlns:a14="http://schemas.microsoft.com/office/drawing/2010/main" val="0"/>
+              </a:ext>
+            </a:extLst>
+          </a:blip>
+          <a:stretch>
+            <a:fillRect/>
+          </a:stretch>
+        </p:blipFill>
+        <p:spPr>
+          <a:xfrm>
+            <a:off x="6586035" y="2885767"/>
+            <a:ext cx="4159391" cy="3607107"/>
+          </a:xfrm>
+          <a:prstGeom prst="rect">
+            <a:avLst/>
+          </a:prstGeom>
+        </p:spPr>
+      </p:pic>
+      <p:sp>
+        <p:nvSpPr>
+          <p:cNvPr id="10" name="Inhaltsplatzhalter 2">
+            <a:extLst>
+              <a:ext uri="{FF2B5EF4-FFF2-40B4-BE49-F238E27FC236}">
+                <a16:creationId xmlns:a16="http://schemas.microsoft.com/office/drawing/2014/main" id="{074D46C4-0040-49FD-85AF-E8BCA56586D3}"/>
+              </a:ext>
+            </a:extLst>
+          </p:cNvPr>
+          <p:cNvSpPr txBox="1">
+            <a:spLocks/>
+          </p:cNvSpPr>
+          <p:nvPr/>
+        </p:nvSpPr>
+        <p:spPr>
+          <a:xfrm>
+            <a:off x="1446573" y="2466363"/>
+            <a:ext cx="4159391" cy="419404"/>
+          </a:xfrm>
+          <a:prstGeom prst="rect">
+            <a:avLst/>
+          </a:prstGeom>
+        </p:spPr>
+        <p:txBody>
+          <a:bodyPr vert="horz" lIns="91440" tIns="45720" rIns="91440" bIns="45720" rtlCol="0">
+            <a:normAutofit lnSpcReduction="10000"/>
+          </a:bodyPr>
+          <a:lstStyle>
+            <a:lvl1pPr marL="228600" indent="-228600" algn="l" defTabSz="914400" rtl="0" eaLnBrk="1" latinLnBrk="0" hangingPunct="1">
+              <a:lnSpc>
+                <a:spcPct val="90000"/>
+              </a:lnSpc>
+              <a:spcBef>
+                <a:spcPts val="1000"/>
+              </a:spcBef>
+              <a:buFont typeface="Arial" panose="020B0604020202020204" pitchFamily="34" charset="0"/>
+              <a:buChar char="•"/>
+              <a:defRPr sz="2800" kern="1200">
+                <a:solidFill>
+                  <a:schemeClr val="tx1"/>
+                </a:solidFill>
+                <a:latin typeface="+mn-lt"/>
+                <a:ea typeface="+mn-ea"/>
+                <a:cs typeface="+mn-cs"/>
+              </a:defRPr>
+            </a:lvl1pPr>
+            <a:lvl2pPr marL="685800" indent="-228600" algn="l" defTabSz="914400" rtl="0" eaLnBrk="1" latinLnBrk="0" hangingPunct="1">
+              <a:lnSpc>
+                <a:spcPct val="90000"/>
+              </a:lnSpc>
+              <a:spcBef>
+                <a:spcPts val="500"/>
+              </a:spcBef>
+              <a:buFont typeface="Arial" panose="020B0604020202020204" pitchFamily="34" charset="0"/>
+              <a:buChar char="•"/>
+              <a:defRPr sz="2400" kern="1200">
+                <a:solidFill>
+                  <a:schemeClr val="tx1"/>
+                </a:solidFill>
+                <a:latin typeface="+mn-lt"/>
+                <a:ea typeface="+mn-ea"/>
+                <a:cs typeface="+mn-cs"/>
+              </a:defRPr>
+            </a:lvl2pPr>
+            <a:lvl3pPr marL="1143000" indent="-228600" algn="l" defTabSz="914400" rtl="0" eaLnBrk="1" latinLnBrk="0" hangingPunct="1">
+              <a:lnSpc>
+                <a:spcPct val="90000"/>
+              </a:lnSpc>
+              <a:spcBef>
+                <a:spcPts val="500"/>
+              </a:spcBef>
+              <a:buFont typeface="Arial" panose="020B0604020202020204" pitchFamily="34" charset="0"/>
+              <a:buChar char="•"/>
+              <a:defRPr sz="2000" kern="1200">
+                <a:solidFill>
+                  <a:schemeClr val="tx1"/>
+                </a:solidFill>
+                <a:latin typeface="+mn-lt"/>
+                <a:ea typeface="+mn-ea"/>
+                <a:cs typeface="+mn-cs"/>
+              </a:defRPr>
+            </a:lvl3pPr>
+            <a:lvl4pPr marL="1600200" indent="-228600" algn="l" defTabSz="914400" rtl="0" eaLnBrk="1" latinLnBrk="0" hangingPunct="1">
+              <a:lnSpc>
+                <a:spcPct val="90000"/>
+              </a:lnSpc>
+              <a:spcBef>
+                <a:spcPts val="500"/>
+              </a:spcBef>
+              <a:buFont typeface="Arial" panose="020B0604020202020204" pitchFamily="34" charset="0"/>
+              <a:buChar char="•"/>
+              <a:defRPr sz="1800" kern="1200">
+                <a:solidFill>
+                  <a:schemeClr val="tx1"/>
+                </a:solidFill>
+                <a:latin typeface="+mn-lt"/>
+                <a:ea typeface="+mn-ea"/>
+                <a:cs typeface="+mn-cs"/>
+              </a:defRPr>
+            </a:lvl4pPr>
+            <a:lvl5pPr marL="2057400" indent="-228600" algn="l" defTabSz="914400" rtl="0" eaLnBrk="1" latinLnBrk="0" hangingPunct="1">
+              <a:lnSpc>
+                <a:spcPct val="90000"/>
+              </a:lnSpc>
+              <a:spcBef>
+                <a:spcPts val="500"/>
+              </a:spcBef>
+              <a:buFont typeface="Arial" panose="020B0604020202020204" pitchFamily="34" charset="0"/>
+              <a:buChar char="•"/>
+              <a:defRPr sz="1800" kern="1200">
+                <a:solidFill>
+                  <a:schemeClr val="tx1"/>
+                </a:solidFill>
+                <a:latin typeface="+mn-lt"/>
+                <a:ea typeface="+mn-ea"/>
+                <a:cs typeface="+mn-cs"/>
+              </a:defRPr>
+            </a:lvl5pPr>
+            <a:lvl6pPr marL="2514600" indent="-228600" algn="l" defTabSz="914400" rtl="0" eaLnBrk="1" latinLnBrk="0" hangingPunct="1">
+              <a:lnSpc>
+                <a:spcPct val="90000"/>
+              </a:lnSpc>
+              <a:spcBef>
+                <a:spcPts val="500"/>
+              </a:spcBef>
+              <a:buFont typeface="Arial" panose="020B0604020202020204" pitchFamily="34" charset="0"/>
+              <a:buChar char="•"/>
+              <a:defRPr sz="1800" kern="1200">
+                <a:solidFill>
+                  <a:schemeClr val="tx1"/>
+                </a:solidFill>
+                <a:latin typeface="+mn-lt"/>
+                <a:ea typeface="+mn-ea"/>
+                <a:cs typeface="+mn-cs"/>
+              </a:defRPr>
+            </a:lvl6pPr>
+            <a:lvl7pPr marL="2971800" indent="-228600" algn="l" defTabSz="914400" rtl="0" eaLnBrk="1" latinLnBrk="0" hangingPunct="1">
+              <a:lnSpc>
+                <a:spcPct val="90000"/>
+              </a:lnSpc>
+              <a:spcBef>
+                <a:spcPts val="500"/>
+              </a:spcBef>
+              <a:buFont typeface="Arial" panose="020B0604020202020204" pitchFamily="34" charset="0"/>
+              <a:buChar char="•"/>
+              <a:defRPr sz="1800" kern="1200">
+                <a:solidFill>
+                  <a:schemeClr val="tx1"/>
+                </a:solidFill>
+                <a:latin typeface="+mn-lt"/>
+                <a:ea typeface="+mn-ea"/>
+                <a:cs typeface="+mn-cs"/>
+              </a:defRPr>
+            </a:lvl7pPr>
+            <a:lvl8pPr marL="3429000" indent="-228600" algn="l" defTabSz="914400" rtl="0" eaLnBrk="1" latinLnBrk="0" hangingPunct="1">
+              <a:lnSpc>
+                <a:spcPct val="90000"/>
+              </a:lnSpc>
+              <a:spcBef>
+                <a:spcPts val="500"/>
+              </a:spcBef>
+              <a:buFont typeface="Arial" panose="020B0604020202020204" pitchFamily="34" charset="0"/>
+              <a:buChar char="•"/>
+              <a:defRPr sz="1800" kern="1200">
+                <a:solidFill>
+                  <a:schemeClr val="tx1"/>
+                </a:solidFill>
+                <a:latin typeface="+mn-lt"/>
+                <a:ea typeface="+mn-ea"/>
+                <a:cs typeface="+mn-cs"/>
+              </a:defRPr>
+            </a:lvl8pPr>
+            <a:lvl9pPr marL="3886200" indent="-228600" algn="l" defTabSz="914400" rtl="0" eaLnBrk="1" latinLnBrk="0" hangingPunct="1">
+              <a:lnSpc>
+                <a:spcPct val="90000"/>
+              </a:lnSpc>
+              <a:spcBef>
+                <a:spcPts val="500"/>
+              </a:spcBef>
+              <a:buFont typeface="Arial" panose="020B0604020202020204" pitchFamily="34" charset="0"/>
+              <a:buChar char="•"/>
+              <a:defRPr sz="1800" kern="1200">
+                <a:solidFill>
+                  <a:schemeClr val="tx1"/>
+                </a:solidFill>
+                <a:latin typeface="+mn-lt"/>
+                <a:ea typeface="+mn-ea"/>
+                <a:cs typeface="+mn-cs"/>
+              </a:defRPr>
+            </a:lvl9pPr>
+          </a:lstStyle>
+          <a:p>
+            <a:pPr marL="0" indent="0">
+              <a:buNone/>
+            </a:pPr>
+            <a:r>
+              <a:rPr lang="de-DE" sz="1200" dirty="0" err="1"/>
+              <a:t>Confusion</a:t>
+            </a:r>
+            <a:r>
+              <a:rPr lang="de-DE" sz="1200" dirty="0"/>
+              <a:t>-Matrix für einen Testdatensatz mit 200 Bildern je Klasse (ohne Augmentation)</a:t>
+            </a:r>
+          </a:p>
+        </p:txBody>
+      </p:sp>
+      <p:sp>
+        <p:nvSpPr>
+          <p:cNvPr id="11" name="Inhaltsplatzhalter 2">
+            <a:extLst>
+              <a:ext uri="{FF2B5EF4-FFF2-40B4-BE49-F238E27FC236}">
+                <a16:creationId xmlns:a16="http://schemas.microsoft.com/office/drawing/2014/main" id="{C5845F37-177B-4EDF-8304-040ADB112C11}"/>
+              </a:ext>
+            </a:extLst>
+          </p:cNvPr>
+          <p:cNvSpPr txBox="1">
+            <a:spLocks/>
+          </p:cNvSpPr>
+          <p:nvPr/>
+        </p:nvSpPr>
+        <p:spPr>
+          <a:xfrm>
+            <a:off x="6586032" y="2466361"/>
+            <a:ext cx="4159391" cy="419405"/>
+          </a:xfrm>
+          <a:prstGeom prst="rect">
+            <a:avLst/>
+          </a:prstGeom>
+        </p:spPr>
+        <p:txBody>
+          <a:bodyPr vert="horz" lIns="91440" tIns="45720" rIns="91440" bIns="45720" rtlCol="0">
+            <a:normAutofit lnSpcReduction="10000"/>
+          </a:bodyPr>
+          <a:lstStyle>
+            <a:lvl1pPr marL="228600" indent="-228600" algn="l" defTabSz="914400" rtl="0" eaLnBrk="1" latinLnBrk="0" hangingPunct="1">
+              <a:lnSpc>
+                <a:spcPct val="90000"/>
+              </a:lnSpc>
+              <a:spcBef>
+                <a:spcPts val="1000"/>
+              </a:spcBef>
+              <a:buFont typeface="Arial" panose="020B0604020202020204" pitchFamily="34" charset="0"/>
+              <a:buChar char="•"/>
+              <a:defRPr sz="2800" kern="1200">
+                <a:solidFill>
+                  <a:schemeClr val="tx1"/>
+                </a:solidFill>
+                <a:latin typeface="+mn-lt"/>
+                <a:ea typeface="+mn-ea"/>
+                <a:cs typeface="+mn-cs"/>
+              </a:defRPr>
+            </a:lvl1pPr>
+            <a:lvl2pPr marL="685800" indent="-228600" algn="l" defTabSz="914400" rtl="0" eaLnBrk="1" latinLnBrk="0" hangingPunct="1">
+              <a:lnSpc>
+                <a:spcPct val="90000"/>
+              </a:lnSpc>
+              <a:spcBef>
+                <a:spcPts val="500"/>
+              </a:spcBef>
+              <a:buFont typeface="Arial" panose="020B0604020202020204" pitchFamily="34" charset="0"/>
+              <a:buChar char="•"/>
+              <a:defRPr sz="2400" kern="1200">
+                <a:solidFill>
+                  <a:schemeClr val="tx1"/>
+                </a:solidFill>
+                <a:latin typeface="+mn-lt"/>
+                <a:ea typeface="+mn-ea"/>
+                <a:cs typeface="+mn-cs"/>
+              </a:defRPr>
+            </a:lvl2pPr>
+            <a:lvl3pPr marL="1143000" indent="-228600" algn="l" defTabSz="914400" rtl="0" eaLnBrk="1" latinLnBrk="0" hangingPunct="1">
+              <a:lnSpc>
+                <a:spcPct val="90000"/>
+              </a:lnSpc>
+              <a:spcBef>
+                <a:spcPts val="500"/>
+              </a:spcBef>
+              <a:buFont typeface="Arial" panose="020B0604020202020204" pitchFamily="34" charset="0"/>
+              <a:buChar char="•"/>
+              <a:defRPr sz="2000" kern="1200">
+                <a:solidFill>
+                  <a:schemeClr val="tx1"/>
+                </a:solidFill>
+                <a:latin typeface="+mn-lt"/>
+                <a:ea typeface="+mn-ea"/>
+                <a:cs typeface="+mn-cs"/>
+              </a:defRPr>
+            </a:lvl3pPr>
+            <a:lvl4pPr marL="1600200" indent="-228600" algn="l" defTabSz="914400" rtl="0" eaLnBrk="1" latinLnBrk="0" hangingPunct="1">
+              <a:lnSpc>
+                <a:spcPct val="90000"/>
+              </a:lnSpc>
+              <a:spcBef>
+                <a:spcPts val="500"/>
+              </a:spcBef>
+              <a:buFont typeface="Arial" panose="020B0604020202020204" pitchFamily="34" charset="0"/>
+              <a:buChar char="•"/>
+              <a:defRPr sz="1800" kern="1200">
+                <a:solidFill>
+                  <a:schemeClr val="tx1"/>
+                </a:solidFill>
+                <a:latin typeface="+mn-lt"/>
+                <a:ea typeface="+mn-ea"/>
+                <a:cs typeface="+mn-cs"/>
+              </a:defRPr>
+            </a:lvl4pPr>
+            <a:lvl5pPr marL="2057400" indent="-228600" algn="l" defTabSz="914400" rtl="0" eaLnBrk="1" latinLnBrk="0" hangingPunct="1">
+              <a:lnSpc>
+                <a:spcPct val="90000"/>
+              </a:lnSpc>
+              <a:spcBef>
+                <a:spcPts val="500"/>
+              </a:spcBef>
+              <a:buFont typeface="Arial" panose="020B0604020202020204" pitchFamily="34" charset="0"/>
+              <a:buChar char="•"/>
+              <a:defRPr sz="1800" kern="1200">
+                <a:solidFill>
+                  <a:schemeClr val="tx1"/>
+                </a:solidFill>
+                <a:latin typeface="+mn-lt"/>
+                <a:ea typeface="+mn-ea"/>
+                <a:cs typeface="+mn-cs"/>
+              </a:defRPr>
+            </a:lvl5pPr>
+            <a:lvl6pPr marL="2514600" indent="-228600" algn="l" defTabSz="914400" rtl="0" eaLnBrk="1" latinLnBrk="0" hangingPunct="1">
+              <a:lnSpc>
+                <a:spcPct val="90000"/>
+              </a:lnSpc>
+              <a:spcBef>
+                <a:spcPts val="500"/>
+              </a:spcBef>
+              <a:buFont typeface="Arial" panose="020B0604020202020204" pitchFamily="34" charset="0"/>
+              <a:buChar char="•"/>
+              <a:defRPr sz="1800" kern="1200">
+                <a:solidFill>
+                  <a:schemeClr val="tx1"/>
+                </a:solidFill>
+                <a:latin typeface="+mn-lt"/>
+                <a:ea typeface="+mn-ea"/>
+                <a:cs typeface="+mn-cs"/>
+              </a:defRPr>
+            </a:lvl6pPr>
+            <a:lvl7pPr marL="2971800" indent="-228600" algn="l" defTabSz="914400" rtl="0" eaLnBrk="1" latinLnBrk="0" hangingPunct="1">
+              <a:lnSpc>
+                <a:spcPct val="90000"/>
+              </a:lnSpc>
+              <a:spcBef>
+                <a:spcPts val="500"/>
+              </a:spcBef>
+              <a:buFont typeface="Arial" panose="020B0604020202020204" pitchFamily="34" charset="0"/>
+              <a:buChar char="•"/>
+              <a:defRPr sz="1800" kern="1200">
+                <a:solidFill>
+                  <a:schemeClr val="tx1"/>
+                </a:solidFill>
+                <a:latin typeface="+mn-lt"/>
+                <a:ea typeface="+mn-ea"/>
+                <a:cs typeface="+mn-cs"/>
+              </a:defRPr>
+            </a:lvl7pPr>
+            <a:lvl8pPr marL="3429000" indent="-228600" algn="l" defTabSz="914400" rtl="0" eaLnBrk="1" latinLnBrk="0" hangingPunct="1">
+              <a:lnSpc>
+                <a:spcPct val="90000"/>
+              </a:lnSpc>
+              <a:spcBef>
+                <a:spcPts val="500"/>
+              </a:spcBef>
+              <a:buFont typeface="Arial" panose="020B0604020202020204" pitchFamily="34" charset="0"/>
+              <a:buChar char="•"/>
+              <a:defRPr sz="1800" kern="1200">
+                <a:solidFill>
+                  <a:schemeClr val="tx1"/>
+                </a:solidFill>
+                <a:latin typeface="+mn-lt"/>
+                <a:ea typeface="+mn-ea"/>
+                <a:cs typeface="+mn-cs"/>
+              </a:defRPr>
+            </a:lvl8pPr>
+            <a:lvl9pPr marL="3886200" indent="-228600" algn="l" defTabSz="914400" rtl="0" eaLnBrk="1" latinLnBrk="0" hangingPunct="1">
+              <a:lnSpc>
+                <a:spcPct val="90000"/>
+              </a:lnSpc>
+              <a:spcBef>
+                <a:spcPts val="500"/>
+              </a:spcBef>
+              <a:buFont typeface="Arial" panose="020B0604020202020204" pitchFamily="34" charset="0"/>
+              <a:buChar char="•"/>
+              <a:defRPr sz="1800" kern="1200">
+                <a:solidFill>
+                  <a:schemeClr val="tx1"/>
+                </a:solidFill>
+                <a:latin typeface="+mn-lt"/>
+                <a:ea typeface="+mn-ea"/>
+                <a:cs typeface="+mn-cs"/>
+              </a:defRPr>
+            </a:lvl9pPr>
+          </a:lstStyle>
+          <a:p>
+            <a:pPr marL="0" indent="0">
+              <a:buNone/>
+            </a:pPr>
+            <a:r>
+              <a:rPr lang="de-DE" sz="1200" dirty="0" err="1"/>
+              <a:t>Confusion</a:t>
+            </a:r>
+            <a:r>
+              <a:rPr lang="de-DE" sz="1200" dirty="0"/>
+              <a:t>-Matrix für den tatsächlichen Datensatz mit 2000 Bildern je Klasse (inkl. Augmentation)</a:t>
+            </a:r>
           </a:p>
         </p:txBody>
       </p:sp>
@@ -4477,55 +4968,114 @@
           </a:p>
         </p:txBody>
       </p:sp>
-      <p:sp>
-        <p:nvSpPr>
-          <p:cNvPr id="3" name="Inhaltsplatzhalter 2">
-            <a:extLst>
-              <a:ext uri="{FF2B5EF4-FFF2-40B4-BE49-F238E27FC236}">
-                <a16:creationId xmlns:a16="http://schemas.microsoft.com/office/drawing/2014/main" id="{3D0E6730-2CE6-4570-95E1-BCB41F33AEB7}"/>
-              </a:ext>
-            </a:extLst>
-          </p:cNvPr>
-          <p:cNvSpPr>
-            <a:spLocks noGrp="1"/>
-          </p:cNvSpPr>
-          <p:nvPr>
-            <p:ph idx="1"/>
-          </p:nvPr>
-        </p:nvSpPr>
-        <p:spPr/>
-        <p:txBody>
-          <a:bodyPr/>
-          <a:lstStyle/>
-          <a:p>
-            <a:r>
-              <a:rPr lang="de-DE" dirty="0"/>
-              <a:t>Hohe Varianz der Bilder innerhalb von Buchstabenklassen</a:t>
-            </a:r>
-          </a:p>
-          <a:p>
-            <a:r>
-              <a:rPr lang="de-DE" dirty="0"/>
-              <a:t>-&gt; gute Wahl der Parameter notwendig</a:t>
-            </a:r>
-          </a:p>
-          <a:p>
-            <a:endParaRPr lang="de-DE" dirty="0"/>
-          </a:p>
-          <a:p>
-            <a:r>
-              <a:rPr lang="de-DE" dirty="0"/>
-              <a:t>CNN bringt wie erwartet bessere Ergebnisse</a:t>
-            </a:r>
-          </a:p>
-          <a:p>
-            <a:endParaRPr lang="de-DE" dirty="0"/>
-          </a:p>
-          <a:p>
-            <a:endParaRPr lang="de-DE" dirty="0"/>
-          </a:p>
-        </p:txBody>
-      </p:sp>
+      <mc:AlternateContent xmlns:mc="http://schemas.openxmlformats.org/markup-compatibility/2006">
+        <mc:Choice xmlns:a14="http://schemas.microsoft.com/office/drawing/2010/main" Requires="a14">
+          <p:sp>
+            <p:nvSpPr>
+              <p:cNvPr id="3" name="Inhaltsplatzhalter 2">
+                <a:extLst>
+                  <a:ext uri="{FF2B5EF4-FFF2-40B4-BE49-F238E27FC236}">
+                    <a16:creationId xmlns:a16="http://schemas.microsoft.com/office/drawing/2014/main" id="{3D0E6730-2CE6-4570-95E1-BCB41F33AEB7}"/>
+                  </a:ext>
+                </a:extLst>
+              </p:cNvPr>
+              <p:cNvSpPr>
+                <a:spLocks noGrp="1"/>
+              </p:cNvSpPr>
+              <p:nvPr>
+                <p:ph idx="1"/>
+              </p:nvPr>
+            </p:nvSpPr>
+            <p:spPr/>
+            <p:txBody>
+              <a:bodyPr/>
+              <a:lstStyle/>
+              <a:p>
+                <a:r>
+                  <a:rPr lang="de-DE" dirty="0"/>
+                  <a:t>Hohe Varianz der Bilder innerhalb von Buchstabenklassen</a:t>
+                </a:r>
+              </a:p>
+              <a:p>
+                <a14:m>
+                  <m:oMath xmlns:m="http://schemas.openxmlformats.org/officeDocument/2006/math">
+                    <m:r>
+                      <a:rPr lang="de-DE" smtClean="0">
+                        <a:latin typeface="Cambria Math" panose="02040503050406030204" pitchFamily="18" charset="0"/>
+                      </a:rPr>
+                      <m:t>→</m:t>
+                    </m:r>
+                    <m:r>
+                      <a:rPr lang="de-DE" b="0" i="0" smtClean="0">
+                        <a:latin typeface="Cambria Math" panose="02040503050406030204" pitchFamily="18" charset="0"/>
+                      </a:rPr>
+                      <m:t> </m:t>
+                    </m:r>
+                  </m:oMath>
+                </a14:m>
+                <a:r>
+                  <a:rPr lang="de-DE" dirty="0"/>
+                  <a:t>gute Wahl der Parameter notwendig</a:t>
+                </a:r>
+              </a:p>
+              <a:p>
+                <a:endParaRPr lang="de-DE" dirty="0"/>
+              </a:p>
+              <a:p>
+                <a:r>
+                  <a:rPr lang="de-DE" dirty="0"/>
+                  <a:t>CNN bringt wie erwartet bessere Ergebnisse</a:t>
+                </a:r>
+              </a:p>
+              <a:p>
+                <a:endParaRPr lang="de-DE" dirty="0"/>
+              </a:p>
+              <a:p>
+                <a:endParaRPr lang="de-DE" dirty="0"/>
+              </a:p>
+            </p:txBody>
+          </p:sp>
+        </mc:Choice>
+        <mc:Fallback>
+          <p:sp>
+            <p:nvSpPr>
+              <p:cNvPr id="3" name="Inhaltsplatzhalter 2">
+                <a:extLst>
+                  <a:ext uri="{FF2B5EF4-FFF2-40B4-BE49-F238E27FC236}">
+                    <a16:creationId xmlns:a16="http://schemas.microsoft.com/office/drawing/2014/main" id="{3D0E6730-2CE6-4570-95E1-BCB41F33AEB7}"/>
+                  </a:ext>
+                </a:extLst>
+              </p:cNvPr>
+              <p:cNvSpPr>
+                <a:spLocks noGrp="1" noRot="1" noChangeAspect="1" noMove="1" noResize="1" noEditPoints="1" noAdjustHandles="1" noChangeArrowheads="1" noChangeShapeType="1" noTextEdit="1"/>
+              </p:cNvSpPr>
+              <p:nvPr>
+                <p:ph idx="1"/>
+              </p:nvPr>
+            </p:nvSpPr>
+            <p:spPr>
+              <a:blipFill>
+                <a:blip r:embed="rId2"/>
+                <a:stretch>
+                  <a:fillRect l="-1043" t="-2241"/>
+                </a:stretch>
+              </a:blipFill>
+            </p:spPr>
+            <p:txBody>
+              <a:bodyPr/>
+              <a:lstStyle/>
+              <a:p>
+                <a:r>
+                  <a:rPr lang="de-DE">
+                    <a:noFill/>
+                  </a:rPr>
+                  <a:t> </a:t>
+                </a:r>
+              </a:p>
+            </p:txBody>
+          </p:sp>
+        </mc:Fallback>
+      </mc:AlternateContent>
     </p:spTree>
     <p:extLst>
       <p:ext uri="{BB962C8B-B14F-4D97-AF65-F5344CB8AC3E}">
@@ -7097,7 +7647,7 @@
           <a:p>
             <a:r>
               <a:rPr lang="de-DE" dirty="0"/>
-              <a:t>CNN – Model (1)</a:t>
+              <a:t>CNN - Model (1)</a:t>
             </a:r>
           </a:p>
         </p:txBody>
@@ -7190,7 +7740,7 @@
           <a:p>
             <a:r>
               <a:rPr lang="de-DE" dirty="0"/>
-              <a:t>CNN – Model (2)</a:t>
+              <a:t>CNN - Model (2)</a:t>
             </a:r>
           </a:p>
         </p:txBody>

</xml_diff>